<commit_message>
added references and acknowledgements
</commit_message>
<xml_diff>
--- a/docs/SCAD Poster/CS341-Final-Poster-Jaywing.pptx
+++ b/docs/SCAD Poster/CS341-Final-Poster-Jaywing.pptx
@@ -4598,7 +4598,7 @@
               </a:lnSpc>
             </a:pPr>
             <a:r>
-              <a:rPr lang="en-US" sz="4000" b="1" dirty="0">
+              <a:rPr lang="en-US" sz="3800" b="1" dirty="0">
                 <a:solidFill>
                   <a:srgbClr val="004B98"/>
                 </a:solidFill>
@@ -4770,7 +4770,7 @@
         <p:spPr bwMode="auto">
           <a:xfrm>
             <a:off x="616405" y="8244383"/>
-            <a:ext cx="9524824" cy="4755148"/>
+            <a:ext cx="9524824" cy="4524315"/>
           </a:xfrm>
           <a:prstGeom prst="rect">
             <a:avLst/>
@@ -4790,7 +4790,7 @@
           <a:lstStyle/>
           <a:p>
             <a:r>
-              <a:rPr lang="en-US" sz="4000" b="1" dirty="0">
+              <a:rPr lang="en-US" sz="3800" b="1" dirty="0">
                 <a:solidFill>
                   <a:srgbClr val="004B98"/>
                 </a:solidFill>
@@ -5015,7 +5015,7 @@
               </a:lnSpc>
             </a:pPr>
             <a:r>
-              <a:rPr lang="en-US" sz="4000" b="1" dirty="0">
+              <a:rPr lang="en-US" sz="3600" b="1" dirty="0">
                 <a:solidFill>
                   <a:srgbClr val="004B98"/>
                 </a:solidFill>
@@ -5065,8 +5065,8 @@
         </p:nvSpPr>
         <p:spPr bwMode="auto">
           <a:xfrm>
-            <a:off x="11043331" y="22409021"/>
-            <a:ext cx="10377781" cy="3693319"/>
+            <a:off x="11027292" y="22300544"/>
+            <a:ext cx="10377781" cy="4108817"/>
           </a:xfrm>
           <a:prstGeom prst="rect">
             <a:avLst/>
@@ -5091,7 +5091,7 @@
               </a:lnSpc>
             </a:pPr>
             <a:r>
-              <a:rPr lang="en-US" sz="4000" b="1" dirty="0">
+              <a:rPr lang="en-US" sz="3600" b="1" dirty="0">
                 <a:solidFill>
                   <a:srgbClr val="004B98"/>
                 </a:solidFill>
@@ -5104,36 +5104,213 @@
           </a:p>
           <a:p>
             <a:r>
-              <a:rPr lang="en-US" sz="2400" dirty="0">
+              <a:rPr lang="en-US" sz="1800" b="1" dirty="0">
                 <a:solidFill>
                   <a:schemeClr val="bg1"/>
                 </a:solidFill>
                 <a:latin typeface="Verdana" panose="020B0604030504040204" pitchFamily="34" charset="0"/>
                 <a:ea typeface="Verdana" panose="020B0604030504040204" pitchFamily="34" charset="0"/>
-                <a:cs typeface="Verdana" panose="020B0604030504040204" pitchFamily="34" charset="0"/>
               </a:rPr>
-              <a:t>Recognize and thank the people who helped you, including your client and team members, anyone who helped you with resources, the course instructor, and other mentors. Include full titles. Also, this is a place to use a bibliography acknowledging open-source frameworks and references that</a:t>
-            </a:r>
-          </a:p>
-          <a:p>
-            <a:r>
-              <a:rPr lang="en-US" sz="2400" dirty="0">
+              <a:t>Special Thanks to:</a:t>
+            </a:r>
+            <a:endParaRPr lang="en-US" sz="1800" dirty="0">
+              <a:solidFill>
+                <a:schemeClr val="bg1"/>
+              </a:solidFill>
+              <a:latin typeface="Verdana" panose="020B0604030504040204" pitchFamily="34" charset="0"/>
+              <a:ea typeface="Verdana" panose="020B0604030504040204" pitchFamily="34" charset="0"/>
+            </a:endParaRPr>
+          </a:p>
+          <a:p>
+            <a:pPr marL="342900" indent="-342900">
+              <a:buFont typeface="Arial" panose="020B0604020202020204" pitchFamily="34" charset="0"/>
+              <a:buChar char="•"/>
+            </a:pPr>
+            <a:r>
+              <a:rPr lang="en-US" sz="1800" dirty="0">
                 <a:solidFill>
                   <a:schemeClr val="bg1"/>
                 </a:solidFill>
                 <a:latin typeface="Verdana" panose="020B0604030504040204" pitchFamily="34" charset="0"/>
                 <a:ea typeface="Verdana" panose="020B0604030504040204" pitchFamily="34" charset="0"/>
-                <a:cs typeface="Verdana" panose="020B0604030504040204" pitchFamily="34" charset="0"/>
               </a:rPr>
-              <a:t>were helpful for training on a particular language or feature.</a:t>
-            </a:r>
-            <a:endParaRPr lang="en-US" sz="2000" dirty="0">
+              <a:t>Professor Nancy </a:t>
+            </a:r>
+            <a:r>
+              <a:rPr lang="en-US" sz="1800" dirty="0" err="1">
+                <a:solidFill>
+                  <a:schemeClr val="bg1"/>
+                </a:solidFill>
+                <a:latin typeface="Verdana" panose="020B0604030504040204" pitchFamily="34" charset="0"/>
+                <a:ea typeface="Verdana" panose="020B0604030504040204" pitchFamily="34" charset="0"/>
+              </a:rPr>
+              <a:t>Reddig</a:t>
+            </a:r>
+            <a:r>
+              <a:rPr lang="en-US" sz="1800" dirty="0">
+                <a:solidFill>
+                  <a:schemeClr val="bg1"/>
+                </a:solidFill>
+                <a:latin typeface="Verdana" panose="020B0604030504040204" pitchFamily="34" charset="0"/>
+                <a:ea typeface="Verdana" panose="020B0604030504040204" pitchFamily="34" charset="0"/>
+              </a:rPr>
+              <a:t>, Computer Science Lecturer, for their guidance and instruction throughout CS 341.</a:t>
+            </a:r>
+          </a:p>
+          <a:p>
+            <a:pPr marL="342900" indent="-342900">
+              <a:buFont typeface="Arial" panose="020B0604020202020204" pitchFamily="34" charset="0"/>
+              <a:buChar char="•"/>
+            </a:pPr>
+            <a:r>
+              <a:rPr lang="en-US" sz="1800" dirty="0">
+                <a:solidFill>
+                  <a:schemeClr val="bg1"/>
+                </a:solidFill>
+                <a:latin typeface="Verdana" panose="020B0604030504040204" pitchFamily="34" charset="0"/>
+                <a:ea typeface="Verdana" panose="020B0604030504040204" pitchFamily="34" charset="0"/>
+              </a:rPr>
+              <a:t>Michelle Henry, Assistant Director of Academic Advising &amp; Starfish, for her valuable insights.</a:t>
+            </a:r>
+          </a:p>
+          <a:p>
+            <a:pPr marL="342900" indent="-342900">
+              <a:buFont typeface="Arial" panose="020B0604020202020204" pitchFamily="34" charset="0"/>
+              <a:buChar char="•"/>
+            </a:pPr>
+            <a:r>
+              <a:rPr lang="en-US" sz="1800" dirty="0">
+                <a:solidFill>
+                  <a:schemeClr val="bg1"/>
+                </a:solidFill>
+                <a:latin typeface="Verdana" panose="020B0604030504040204" pitchFamily="34" charset="0"/>
+                <a:ea typeface="Verdana" panose="020B0604030504040204" pitchFamily="34" charset="0"/>
+              </a:rPr>
+              <a:t>Dr. </a:t>
+            </a:r>
+            <a:r>
+              <a:rPr lang="en-US" sz="1800" dirty="0" err="1">
+                <a:solidFill>
+                  <a:schemeClr val="bg1"/>
+                </a:solidFill>
+                <a:latin typeface="Verdana" panose="020B0604030504040204" pitchFamily="34" charset="0"/>
+                <a:ea typeface="Verdana" panose="020B0604030504040204" pitchFamily="34" charset="0"/>
+              </a:rPr>
+              <a:t>Peilong</a:t>
+            </a:r>
+            <a:r>
+              <a:rPr lang="en-US" sz="1800" dirty="0">
+                <a:solidFill>
+                  <a:schemeClr val="bg1"/>
+                </a:solidFill>
+                <a:latin typeface="Verdana" panose="020B0604030504040204" pitchFamily="34" charset="0"/>
+                <a:ea typeface="Verdana" panose="020B0604030504040204" pitchFamily="34" charset="0"/>
+              </a:rPr>
+              <a:t> Li, Associate Professor of Computer Science, Keagan Kinney and James Hutchins, Mindset Mentors, for their contributions to user stories.</a:t>
+            </a:r>
+          </a:p>
+          <a:p>
+            <a:pPr marL="342900" indent="-342900">
+              <a:buFont typeface="Arial" panose="020B0604020202020204" pitchFamily="34" charset="0"/>
+              <a:buChar char="•"/>
+            </a:pPr>
+            <a:r>
+              <a:rPr lang="en-US" sz="1800" dirty="0">
+                <a:solidFill>
+                  <a:schemeClr val="bg1"/>
+                </a:solidFill>
+                <a:latin typeface="Verdana" panose="020B0604030504040204" pitchFamily="34" charset="0"/>
+                <a:ea typeface="Verdana" panose="020B0604030504040204" pitchFamily="34" charset="0"/>
+              </a:rPr>
+              <a:t>Danielle </a:t>
+            </a:r>
+            <a:r>
+              <a:rPr lang="en-US" sz="1800" dirty="0" err="1">
+                <a:solidFill>
+                  <a:schemeClr val="bg1"/>
+                </a:solidFill>
+                <a:latin typeface="Verdana" panose="020B0604030504040204" pitchFamily="34" charset="0"/>
+                <a:ea typeface="Verdana" panose="020B0604030504040204" pitchFamily="34" charset="0"/>
+              </a:rPr>
+              <a:t>Strausburger</a:t>
+            </a:r>
+            <a:r>
+              <a:rPr lang="en-US" sz="1800" dirty="0">
+                <a:solidFill>
+                  <a:schemeClr val="bg1"/>
+                </a:solidFill>
+                <a:latin typeface="Verdana" panose="020B0604030504040204" pitchFamily="34" charset="0"/>
+                <a:ea typeface="Verdana" panose="020B0604030504040204" pitchFamily="34" charset="0"/>
+              </a:rPr>
+              <a:t>, TA &amp; Senior Computer Science Student, for conceptualizing the original idea in Web Development CS 310.</a:t>
+            </a:r>
+          </a:p>
+          <a:p>
+            <a:r>
+              <a:rPr lang="en-US" sz="1800" b="1" dirty="0">
+                <a:solidFill>
+                  <a:schemeClr val="bg1"/>
+                </a:solidFill>
+                <a:latin typeface="Verdana" panose="020B0604030504040204" pitchFamily="34" charset="0"/>
+                <a:ea typeface="Verdana" panose="020B0604030504040204" pitchFamily="34" charset="0"/>
+              </a:rPr>
+              <a:t>Technical References</a:t>
+            </a:r>
+          </a:p>
+          <a:p>
+            <a:pPr>
+              <a:buFont typeface="Arial" panose="020B0604020202020204" pitchFamily="34" charset="0"/>
+              <a:buChar char="•"/>
+            </a:pPr>
+            <a:r>
+              <a:rPr lang="en-US" sz="1800" dirty="0">
+                <a:solidFill>
+                  <a:schemeClr val="bg1"/>
+                </a:solidFill>
+                <a:latin typeface="Verdana" panose="020B0604030504040204" pitchFamily="34" charset="0"/>
+                <a:ea typeface="Verdana" panose="020B0604030504040204" pitchFamily="34" charset="0"/>
+              </a:rPr>
+              <a:t>Bootstrap Documentation (Version 5.3) </a:t>
+            </a:r>
+          </a:p>
+          <a:p>
+            <a:pPr marL="742950" lvl="1" indent="-285750">
+              <a:buFont typeface="Arial" panose="020B0604020202020204" pitchFamily="34" charset="0"/>
+              <a:buChar char="•"/>
+            </a:pPr>
+            <a:r>
+              <a:rPr lang="en-US" sz="1800" dirty="0">
+                <a:solidFill>
+                  <a:schemeClr val="bg1"/>
+                </a:solidFill>
+                <a:latin typeface="Verdana" panose="020B0604030504040204" pitchFamily="34" charset="0"/>
+                <a:ea typeface="Verdana" panose="020B0604030504040204" pitchFamily="34" charset="0"/>
+              </a:rPr>
+              <a:t>URL: </a:t>
+            </a:r>
+            <a:r>
+              <a:rPr lang="en-US" sz="1800" dirty="0">
+                <a:solidFill>
+                  <a:schemeClr val="bg1"/>
+                </a:solidFill>
+                <a:latin typeface="Verdana" panose="020B0604030504040204" pitchFamily="34" charset="0"/>
+                <a:ea typeface="Verdana" panose="020B0604030504040204" pitchFamily="34" charset="0"/>
+                <a:hlinkClick r:id="rId4">
+                  <a:extLst>
+                    <a:ext uri="{A12FA001-AC4F-418D-AE19-62706E023703}">
+                      <ahyp:hlinkClr xmlns:ahyp="http://schemas.microsoft.com/office/drawing/2018/hyperlinkcolor" val="tx"/>
+                    </a:ext>
+                  </a:extLst>
+                </a:hlinkClick>
+              </a:rPr>
+              <a:t>https://getbootstrap.com/docs/5.3/getting-started/introduction/</a:t>
+            </a:r>
+            <a:endParaRPr lang="en-US" sz="1800" dirty="0">
               <a:solidFill>
-                <a:srgbClr val="0A2240"/>
+                <a:schemeClr val="bg1"/>
               </a:solidFill>
               <a:latin typeface="Verdana" panose="020B0604030504040204" pitchFamily="34" charset="0"/>
               <a:ea typeface="Verdana" panose="020B0604030504040204" pitchFamily="34" charset="0"/>
-              <a:cs typeface="Verdana" panose="020B0604030504040204" pitchFamily="34" charset="0"/>
             </a:endParaRPr>
           </a:p>
         </p:txBody>
@@ -5180,7 +5357,7 @@
               </a:lnSpc>
             </a:pPr>
             <a:r>
-              <a:rPr lang="en-US" sz="4400" b="1" dirty="0">
+              <a:rPr lang="en-US" sz="3800" b="1" dirty="0">
                 <a:solidFill>
                   <a:srgbClr val="004B98"/>
                 </a:solidFill>
@@ -5223,29 +5400,7 @@
                 <a:ea typeface="Verdana" panose="020B0604030504040204" pitchFamily="34" charset="0"/>
                 <a:cs typeface="Verdana" panose="020B0604030504040204" pitchFamily="34" charset="0"/>
               </a:rPr>
-              <a:t> Academy centralizes all campus tutoring to </a:t>
-            </a:r>
-            <a:r>
-              <a:rPr lang="en-US" sz="2400">
-                <a:solidFill>
-                  <a:schemeClr val="bg1"/>
-                </a:solidFill>
-                <a:latin typeface="Verdana" panose="020B0604030504040204" pitchFamily="34" charset="0"/>
-                <a:ea typeface="Verdana" panose="020B0604030504040204" pitchFamily="34" charset="0"/>
-                <a:cs typeface="Verdana" panose="020B0604030504040204" pitchFamily="34" charset="0"/>
-              </a:rPr>
-              <a:t>a single </a:t>
-            </a:r>
-            <a:r>
-              <a:rPr lang="en-US" sz="2400" dirty="0">
-                <a:solidFill>
-                  <a:schemeClr val="bg1"/>
-                </a:solidFill>
-                <a:latin typeface="Verdana" panose="020B0604030504040204" pitchFamily="34" charset="0"/>
-                <a:ea typeface="Verdana" panose="020B0604030504040204" pitchFamily="34" charset="0"/>
-                <a:cs typeface="Verdana" panose="020B0604030504040204" pitchFamily="34" charset="0"/>
-              </a:rPr>
-              <a:t>platform, providing faster, simpler services whilst offering incentives for participation and valuable academic insights to professors. </a:t>
+              <a:t> Academy centralizes all campus tutoring to a single platform, providing faster, simpler services whilst offering incentives for participation and valuable academic insights to professors. </a:t>
             </a:r>
             <a:endParaRPr lang="en-US" sz="2400" dirty="0">
               <a:solidFill>
@@ -5331,7 +5486,7 @@
           <p:nvPr/>
         </p:nvPicPr>
         <p:blipFill>
-          <a:blip r:embed="rId4">
+          <a:blip r:embed="rId5">
             <a:extLst>
               <a:ext uri="{28A0092B-C50C-407E-A947-70E740481C1C}">
                 <a14:useLocalDpi xmlns:a14="http://schemas.microsoft.com/office/drawing/2010/main" val="0"/>
@@ -5537,7 +5692,7 @@
               </a:spcAft>
             </a:pPr>
             <a:r>
-              <a:rPr lang="en-US" sz="4400" b="1" dirty="0">
+              <a:rPr lang="en-US" sz="3800" b="1" dirty="0">
                 <a:solidFill>
                   <a:srgbClr val="004B98"/>
                 </a:solidFill>
@@ -5547,7 +5702,7 @@
               </a:rPr>
               <a:t>PROTOTYPE/PROCESS</a:t>
             </a:r>
-            <a:endParaRPr lang="en-US" sz="4400" b="1" dirty="0">
+            <a:endParaRPr lang="en-US" sz="3800" b="1" dirty="0">
               <a:solidFill>
                 <a:schemeClr val="tx1"/>
               </a:solidFill>
@@ -5625,7 +5780,7 @@
           <p:nvPr/>
         </p:nvPicPr>
         <p:blipFill>
-          <a:blip r:embed="rId5"/>
+          <a:blip r:embed="rId6"/>
           <a:stretch>
             <a:fillRect/>
           </a:stretch>
@@ -5655,7 +5810,7 @@
           <p:nvPr/>
         </p:nvPicPr>
         <p:blipFill>
-          <a:blip r:embed="rId6"/>
+          <a:blip r:embed="rId7"/>
           <a:stretch>
             <a:fillRect/>
           </a:stretch>
@@ -5685,7 +5840,7 @@
           <p:nvPr/>
         </p:nvPicPr>
         <p:blipFill>
-          <a:blip r:embed="rId7"/>
+          <a:blip r:embed="rId8"/>
           <a:stretch>
             <a:fillRect/>
           </a:stretch>
@@ -5761,7 +5916,7 @@
           <p:nvPr/>
         </p:nvPicPr>
         <p:blipFill>
-          <a:blip r:embed="rId8"/>
+          <a:blip r:embed="rId9"/>
           <a:stretch>
             <a:fillRect/>
           </a:stretch>
@@ -5791,7 +5946,7 @@
           <p:nvPr/>
         </p:nvPicPr>
         <p:blipFill>
-          <a:blip r:embed="rId9"/>
+          <a:blip r:embed="rId10"/>
           <a:stretch>
             <a:fillRect/>
           </a:stretch>
@@ -5821,7 +5976,7 @@
           <p:nvPr/>
         </p:nvPicPr>
         <p:blipFill>
-          <a:blip r:embed="rId10"/>
+          <a:blip r:embed="rId11"/>
           <a:stretch>
             <a:fillRect/>
           </a:stretch>
@@ -5851,7 +6006,7 @@
           <p:nvPr/>
         </p:nvPicPr>
         <p:blipFill>
-          <a:blip r:embed="rId11"/>
+          <a:blip r:embed="rId12"/>
           <a:stretch>
             <a:fillRect/>
           </a:stretch>
@@ -5881,7 +6036,7 @@
           <p:nvPr/>
         </p:nvPicPr>
         <p:blipFill>
-          <a:blip r:embed="rId12"/>
+          <a:blip r:embed="rId13"/>
           <a:stretch>
             <a:fillRect/>
           </a:stretch>
@@ -5954,7 +6109,7 @@
           <p:nvPr/>
         </p:nvPicPr>
         <p:blipFill>
-          <a:blip r:embed="rId13"/>
+          <a:blip r:embed="rId14"/>
           <a:stretch>
             <a:fillRect/>
           </a:stretch>
@@ -6156,7 +6311,7 @@
           <p:nvPr/>
         </p:nvPicPr>
         <p:blipFill>
-          <a:blip r:embed="rId14">
+          <a:blip r:embed="rId15">
             <a:extLst>
               <a:ext uri="{28A0092B-C50C-407E-A947-70E740481C1C}">
                 <a14:useLocalDpi xmlns:a14="http://schemas.microsoft.com/office/drawing/2010/main" val="0"/>
@@ -6795,6 +6950,34 @@
 </file>
 
 <file path=customXml/item1.xml><?xml version="1.0" encoding="utf-8"?>
+<p:properties xmlns:p="http://schemas.microsoft.com/office/2006/metadata/properties" xmlns:xsi="http://www.w3.org/2001/XMLSchema-instance" xmlns:pc="http://schemas.microsoft.com/office/infopath/2007/PartnerControls">
+  <documentManagement>
+    <TaxCatchAll xmlns="c875c36d-ac51-4e84-9442-bee5089cbcea" xsi:nil="true"/>
+    <lcf76f155ced4ddcb4097134ff3c332f xmlns="fab6ae7d-06c6-440f-bba1-9caa7231207d">
+      <Terms xmlns="http://schemas.microsoft.com/office/infopath/2007/PartnerControls"/>
+    </lcf76f155ced4ddcb4097134ff3c332f>
+    <MediaLengthInSeconds xmlns="fab6ae7d-06c6-440f-bba1-9caa7231207d" xsi:nil="true"/>
+    <SharedWithUsers xmlns="c875c36d-ac51-4e84-9442-bee5089cbcea">
+      <UserInfo>
+        <DisplayName/>
+        <AccountId xsi:nil="true"/>
+        <AccountType/>
+      </UserInfo>
+    </SharedWithUsers>
+  </documentManagement>
+</p:properties>
+</file>
+
+<file path=customXml/item2.xml><?xml version="1.0" encoding="utf-8"?>
+<?mso-contentType ?>
+<FormTemplates xmlns="http://schemas.microsoft.com/sharepoint/v3/contenttype/forms">
+  <Display>DocumentLibraryForm</Display>
+  <Edit>DocumentLibraryForm</Edit>
+  <New>DocumentLibraryForm</New>
+</FormTemplates>
+</file>
+
+<file path=customXml/item3.xml><?xml version="1.0" encoding="utf-8"?>
 <ct:contentTypeSchema xmlns:ct="http://schemas.microsoft.com/office/2006/metadata/contentType" xmlns:ma="http://schemas.microsoft.com/office/2006/metadata/properties/metaAttributes" ct:_="" ma:_="" ma:contentTypeName="Document" ma:contentTypeID="0x0101008EFA95D5A453204B82B388E0EAEB7722" ma:contentTypeVersion="17" ma:contentTypeDescription="Create a new document." ma:contentTypeScope="" ma:versionID="dda70ad3042d19a9677b7138053d1fa9">
   <xsd:schema xmlns:xsd="http://www.w3.org/2001/XMLSchema" xmlns:xs="http://www.w3.org/2001/XMLSchema" xmlns:p="http://schemas.microsoft.com/office/2006/metadata/properties" xmlns:ns2="fab6ae7d-06c6-440f-bba1-9caa7231207d" xmlns:ns3="c875c36d-ac51-4e84-9442-bee5089cbcea" targetNamespace="http://schemas.microsoft.com/office/2006/metadata/properties" ma:root="true" ma:fieldsID="98010f272a5ba5ef2e8b4481ca434998" ns2:_="" ns3:_="">
     <xsd:import namespace="fab6ae7d-06c6-440f-bba1-9caa7231207d"/>
@@ -7043,35 +7226,32 @@
 </ct:contentTypeSchema>
 </file>
 
-<file path=customXml/item2.xml><?xml version="1.0" encoding="utf-8"?>
-<?mso-contentType ?>
-<FormTemplates xmlns="http://schemas.microsoft.com/sharepoint/v3/contenttype/forms">
-  <Display>DocumentLibraryForm</Display>
-  <Edit>DocumentLibraryForm</Edit>
-  <New>DocumentLibraryForm</New>
-</FormTemplates>
+<file path=customXml/itemProps1.xml><?xml version="1.0" encoding="utf-8"?>
+<ds:datastoreItem xmlns:ds="http://schemas.openxmlformats.org/officeDocument/2006/customXml" ds:itemID="{3A28B7BE-1EEF-4846-B0EC-E672D97B7FFD}">
+  <ds:schemaRefs>
+    <ds:schemaRef ds:uri="http://www.w3.org/XML/1998/namespace"/>
+    <ds:schemaRef ds:uri="http://schemas.microsoft.com/office/2006/documentManagement/types"/>
+    <ds:schemaRef ds:uri="http://purl.org/dc/terms/"/>
+    <ds:schemaRef ds:uri="fab6ae7d-06c6-440f-bba1-9caa7231207d"/>
+    <ds:schemaRef ds:uri="http://purl.org/dc/elements/1.1/"/>
+    <ds:schemaRef ds:uri="http://purl.org/dc/dcmitype/"/>
+    <ds:schemaRef ds:uri="http://schemas.microsoft.com/office/infopath/2007/PartnerControls"/>
+    <ds:schemaRef ds:uri="http://schemas.openxmlformats.org/package/2006/metadata/core-properties"/>
+    <ds:schemaRef ds:uri="c875c36d-ac51-4e84-9442-bee5089cbcea"/>
+    <ds:schemaRef ds:uri="http://schemas.microsoft.com/office/2006/metadata/properties"/>
+  </ds:schemaRefs>
+</ds:datastoreItem>
 </file>
 
-<file path=customXml/item3.xml><?xml version="1.0" encoding="utf-8"?>
-<p:properties xmlns:p="http://schemas.microsoft.com/office/2006/metadata/properties" xmlns:xsi="http://www.w3.org/2001/XMLSchema-instance" xmlns:pc="http://schemas.microsoft.com/office/infopath/2007/PartnerControls">
-  <documentManagement>
-    <TaxCatchAll xmlns="c875c36d-ac51-4e84-9442-bee5089cbcea" xsi:nil="true"/>
-    <lcf76f155ced4ddcb4097134ff3c332f xmlns="fab6ae7d-06c6-440f-bba1-9caa7231207d">
-      <Terms xmlns="http://schemas.microsoft.com/office/infopath/2007/PartnerControls"/>
-    </lcf76f155ced4ddcb4097134ff3c332f>
-    <MediaLengthInSeconds xmlns="fab6ae7d-06c6-440f-bba1-9caa7231207d" xsi:nil="true"/>
-    <SharedWithUsers xmlns="c875c36d-ac51-4e84-9442-bee5089cbcea">
-      <UserInfo>
-        <DisplayName/>
-        <AccountId xsi:nil="true"/>
-        <AccountType/>
-      </UserInfo>
-    </SharedWithUsers>
-  </documentManagement>
-</p:properties>
+<file path=customXml/itemProps2.xml><?xml version="1.0" encoding="utf-8"?>
+<ds:datastoreItem xmlns:ds="http://schemas.openxmlformats.org/officeDocument/2006/customXml" ds:itemID="{EA638ADA-06DF-45AB-BFB2-D0D6F294C0ED}">
+  <ds:schemaRefs>
+    <ds:schemaRef ds:uri="http://schemas.microsoft.com/sharepoint/v3/contenttype/forms"/>
+  </ds:schemaRefs>
+</ds:datastoreItem>
 </file>
 
-<file path=customXml/itemProps1.xml><?xml version="1.0" encoding="utf-8"?>
+<file path=customXml/itemProps3.xml><?xml version="1.0" encoding="utf-8"?>
 <ds:datastoreItem xmlns:ds="http://schemas.openxmlformats.org/officeDocument/2006/customXml" ds:itemID="{32646343-FA08-41DE-B0D1-4C7CF84D7151}">
   <ds:schemaRefs>
     <ds:schemaRef ds:uri="http://schemas.microsoft.com/office/2006/metadata/contentType"/>
@@ -7088,29 +7268,4 @@
     <ds:schemaRef ds:uri="http://schemas.microsoft.com/internal/obd"/>
   </ds:schemaRefs>
 </ds:datastoreItem>
-</file>
-
-<file path=customXml/itemProps2.xml><?xml version="1.0" encoding="utf-8"?>
-<ds:datastoreItem xmlns:ds="http://schemas.openxmlformats.org/officeDocument/2006/customXml" ds:itemID="{EA638ADA-06DF-45AB-BFB2-D0D6F294C0ED}">
-  <ds:schemaRefs>
-    <ds:schemaRef ds:uri="http://schemas.microsoft.com/sharepoint/v3/contenttype/forms"/>
-  </ds:schemaRefs>
-</ds:datastoreItem>
-</file>
-
-<file path=customXml/itemProps3.xml><?xml version="1.0" encoding="utf-8"?>
-<ds:datastoreItem xmlns:ds="http://schemas.openxmlformats.org/officeDocument/2006/customXml" ds:itemID="{3A28B7BE-1EEF-4846-B0EC-E672D97B7FFD}">
-  <ds:schemaRefs>
-    <ds:schemaRef ds:uri="http://www.w3.org/XML/1998/namespace"/>
-    <ds:schemaRef ds:uri="http://schemas.microsoft.com/office/2006/documentManagement/types"/>
-    <ds:schemaRef ds:uri="http://purl.org/dc/terms/"/>
-    <ds:schemaRef ds:uri="fab6ae7d-06c6-440f-bba1-9caa7231207d"/>
-    <ds:schemaRef ds:uri="http://purl.org/dc/elements/1.1/"/>
-    <ds:schemaRef ds:uri="http://purl.org/dc/dcmitype/"/>
-    <ds:schemaRef ds:uri="http://schemas.microsoft.com/office/infopath/2007/PartnerControls"/>
-    <ds:schemaRef ds:uri="http://schemas.openxmlformats.org/package/2006/metadata/core-properties"/>
-    <ds:schemaRef ds:uri="c875c36d-ac51-4e84-9442-bee5089cbcea"/>
-    <ds:schemaRef ds:uri="http://schemas.microsoft.com/office/2006/metadata/properties"/>
-  </ds:schemaRefs>
-</ds:datastoreItem>
 </file>
</xml_diff>